<commit_message>
Updated with images and discriptions
</commit_message>
<xml_diff>
--- a/Documentation/Architecture/NoteShare System Architecture.pptx
+++ b/Documentation/Architecture/NoteShare System Architecture.pptx
@@ -5,19 +5,22 @@
     <p:sldMasterId id="2147483660" r:id="rId1"/>
   </p:sldMasterIdLst>
   <p:notesMasterIdLst>
-    <p:notesMasterId r:id="rId12"/>
+    <p:notesMasterId r:id="rId15"/>
   </p:notesMasterIdLst>
   <p:sldIdLst>
     <p:sldId id="256" r:id="rId2"/>
     <p:sldId id="257" r:id="rId3"/>
-    <p:sldId id="258" r:id="rId4"/>
-    <p:sldId id="262" r:id="rId5"/>
-    <p:sldId id="259" r:id="rId6"/>
-    <p:sldId id="261" r:id="rId7"/>
-    <p:sldId id="260" r:id="rId8"/>
-    <p:sldId id="263" r:id="rId9"/>
-    <p:sldId id="265" r:id="rId10"/>
-    <p:sldId id="264" r:id="rId11"/>
+    <p:sldId id="266" r:id="rId4"/>
+    <p:sldId id="258" r:id="rId5"/>
+    <p:sldId id="262" r:id="rId6"/>
+    <p:sldId id="259" r:id="rId7"/>
+    <p:sldId id="261" r:id="rId8"/>
+    <p:sldId id="267" r:id="rId9"/>
+    <p:sldId id="268" r:id="rId10"/>
+    <p:sldId id="260" r:id="rId11"/>
+    <p:sldId id="263" r:id="rId12"/>
+    <p:sldId id="265" r:id="rId13"/>
+    <p:sldId id="264" r:id="rId14"/>
   </p:sldIdLst>
   <p:sldSz cx="9144000" cy="6858000" type="screen4x3"/>
   <p:notesSz cx="6858000" cy="9144000"/>
@@ -168,7 +171,7 @@
             </a:lvl1pPr>
           </a:lstStyle>
           <a:p>
-            <a:endParaRPr lang="en-US"/>
+            <a:endParaRPr lang="en-US" dirty="0"/>
           </a:p>
         </p:txBody>
       </p:sp>
@@ -204,7 +207,7 @@
               <a:pPr/>
               <a:t>10/11/2009</a:t>
             </a:fld>
-            <a:endParaRPr lang="en-US"/>
+            <a:endParaRPr lang="en-US" dirty="0"/>
           </a:p>
         </p:txBody>
       </p:sp>
@@ -237,7 +240,7 @@
           <a:bodyPr vert="horz" lIns="91440" tIns="45720" rIns="91440" bIns="45720" rtlCol="0" anchor="ctr"/>
           <a:lstStyle/>
           <a:p>
-            <a:endParaRPr lang="en-US"/>
+            <a:endParaRPr lang="en-US" dirty="0"/>
           </a:p>
         </p:txBody>
       </p:sp>
@@ -330,7 +333,7 @@
             </a:lvl1pPr>
           </a:lstStyle>
           <a:p>
-            <a:endParaRPr lang="en-US"/>
+            <a:endParaRPr lang="en-US" dirty="0"/>
           </a:p>
         </p:txBody>
       </p:sp>
@@ -366,7 +369,7 @@
               <a:pPr/>
               <a:t>‹#›</a:t>
             </a:fld>
-            <a:endParaRPr lang="en-US"/>
+            <a:endParaRPr lang="en-US" dirty="0"/>
           </a:p>
         </p:txBody>
       </p:sp>
@@ -514,7 +517,7 @@
           </a:bodyPr>
           <a:lstStyle/>
           <a:p>
-            <a:endParaRPr lang="en-US"/>
+            <a:endParaRPr lang="en-US" dirty="0"/>
           </a:p>
         </p:txBody>
       </p:sp>
@@ -538,7 +541,7 @@
               <a:pPr/>
               <a:t>1</a:t>
             </a:fld>
-            <a:endParaRPr lang="en-US"/>
+            <a:endParaRPr lang="en-US" dirty="0"/>
           </a:p>
         </p:txBody>
       </p:sp>
@@ -596,7 +599,7 @@
           </a:bodyPr>
           <a:lstStyle/>
           <a:p>
-            <a:endParaRPr lang="en-US"/>
+            <a:endParaRPr lang="en-US" dirty="0"/>
           </a:p>
         </p:txBody>
       </p:sp>
@@ -618,9 +621,9 @@
             <a:fld id="{0FDCCBAA-96C4-4B98-AC5E-B795FCF6C43C}" type="slidenum">
               <a:rPr lang="en-US" smtClean="0"/>
               <a:pPr/>
-              <a:t>10</a:t>
+              <a:t>13</a:t>
             </a:fld>
-            <a:endParaRPr lang="en-US"/>
+            <a:endParaRPr lang="en-US" dirty="0"/>
           </a:p>
         </p:txBody>
       </p:sp>
@@ -678,7 +681,7 @@
           </a:bodyPr>
           <a:lstStyle/>
           <a:p>
-            <a:endParaRPr lang="en-US"/>
+            <a:endParaRPr lang="en-US" dirty="0"/>
           </a:p>
         </p:txBody>
       </p:sp>
@@ -702,7 +705,7 @@
               <a:pPr/>
               <a:t>2</a:t>
             </a:fld>
-            <a:endParaRPr lang="en-US"/>
+            <a:endParaRPr lang="en-US" dirty="0"/>
           </a:p>
         </p:txBody>
       </p:sp>
@@ -760,7 +763,7 @@
           </a:bodyPr>
           <a:lstStyle/>
           <a:p>
-            <a:endParaRPr lang="en-US"/>
+            <a:endParaRPr lang="en-US" dirty="0"/>
           </a:p>
         </p:txBody>
       </p:sp>
@@ -782,9 +785,9 @@
             <a:fld id="{0FDCCBAA-96C4-4B98-AC5E-B795FCF6C43C}" type="slidenum">
               <a:rPr lang="en-US" smtClean="0"/>
               <a:pPr/>
-              <a:t>3</a:t>
+              <a:t>4</a:t>
             </a:fld>
-            <a:endParaRPr lang="en-US"/>
+            <a:endParaRPr lang="en-US" dirty="0"/>
           </a:p>
         </p:txBody>
       </p:sp>
@@ -842,7 +845,7 @@
           </a:bodyPr>
           <a:lstStyle/>
           <a:p>
-            <a:endParaRPr lang="en-US"/>
+            <a:endParaRPr lang="en-US" dirty="0"/>
           </a:p>
         </p:txBody>
       </p:sp>
@@ -864,9 +867,9 @@
             <a:fld id="{0FDCCBAA-96C4-4B98-AC5E-B795FCF6C43C}" type="slidenum">
               <a:rPr lang="en-US" smtClean="0"/>
               <a:pPr/>
-              <a:t>4</a:t>
+              <a:t>5</a:t>
             </a:fld>
-            <a:endParaRPr lang="en-US"/>
+            <a:endParaRPr lang="en-US" dirty="0"/>
           </a:p>
         </p:txBody>
       </p:sp>
@@ -924,7 +927,7 @@
           </a:bodyPr>
           <a:lstStyle/>
           <a:p>
-            <a:endParaRPr lang="en-US"/>
+            <a:endParaRPr lang="en-US" dirty="0"/>
           </a:p>
         </p:txBody>
       </p:sp>
@@ -946,9 +949,9 @@
             <a:fld id="{0FDCCBAA-96C4-4B98-AC5E-B795FCF6C43C}" type="slidenum">
               <a:rPr lang="en-US" smtClean="0"/>
               <a:pPr/>
-              <a:t>5</a:t>
+              <a:t>6</a:t>
             </a:fld>
-            <a:endParaRPr lang="en-US"/>
+            <a:endParaRPr lang="en-US" dirty="0"/>
           </a:p>
         </p:txBody>
       </p:sp>
@@ -1006,7 +1009,7 @@
           </a:bodyPr>
           <a:lstStyle/>
           <a:p>
-            <a:endParaRPr lang="en-US"/>
+            <a:endParaRPr lang="en-US" dirty="0"/>
           </a:p>
         </p:txBody>
       </p:sp>
@@ -1028,9 +1031,9 @@
             <a:fld id="{0FDCCBAA-96C4-4B98-AC5E-B795FCF6C43C}" type="slidenum">
               <a:rPr lang="en-US" smtClean="0"/>
               <a:pPr/>
-              <a:t>6</a:t>
+              <a:t>7</a:t>
             </a:fld>
-            <a:endParaRPr lang="en-US"/>
+            <a:endParaRPr lang="en-US" dirty="0"/>
           </a:p>
         </p:txBody>
       </p:sp>
@@ -1088,7 +1091,7 @@
           </a:bodyPr>
           <a:lstStyle/>
           <a:p>
-            <a:endParaRPr lang="en-US"/>
+            <a:endParaRPr lang="en-US" dirty="0"/>
           </a:p>
         </p:txBody>
       </p:sp>
@@ -1110,9 +1113,9 @@
             <a:fld id="{0FDCCBAA-96C4-4B98-AC5E-B795FCF6C43C}" type="slidenum">
               <a:rPr lang="en-US" smtClean="0"/>
               <a:pPr/>
-              <a:t>7</a:t>
+              <a:t>10</a:t>
             </a:fld>
-            <a:endParaRPr lang="en-US"/>
+            <a:endParaRPr lang="en-US" dirty="0"/>
           </a:p>
         </p:txBody>
       </p:sp>
@@ -1170,7 +1173,7 @@
           </a:bodyPr>
           <a:lstStyle/>
           <a:p>
-            <a:endParaRPr lang="en-US"/>
+            <a:endParaRPr lang="en-US" dirty="0"/>
           </a:p>
         </p:txBody>
       </p:sp>
@@ -1192,9 +1195,9 @@
             <a:fld id="{0FDCCBAA-96C4-4B98-AC5E-B795FCF6C43C}" type="slidenum">
               <a:rPr lang="en-US" smtClean="0"/>
               <a:pPr/>
-              <a:t>8</a:t>
+              <a:t>11</a:t>
             </a:fld>
-            <a:endParaRPr lang="en-US"/>
+            <a:endParaRPr lang="en-US" dirty="0"/>
           </a:p>
         </p:txBody>
       </p:sp>
@@ -1252,7 +1255,7 @@
           </a:bodyPr>
           <a:lstStyle/>
           <a:p>
-            <a:endParaRPr lang="en-US"/>
+            <a:endParaRPr lang="en-US" dirty="0"/>
           </a:p>
         </p:txBody>
       </p:sp>
@@ -1274,9 +1277,9 @@
             <a:fld id="{0FDCCBAA-96C4-4B98-AC5E-B795FCF6C43C}" type="slidenum">
               <a:rPr lang="en-US" smtClean="0"/>
               <a:pPr/>
-              <a:t>9</a:t>
+              <a:t>12</a:t>
             </a:fld>
-            <a:endParaRPr lang="en-US"/>
+            <a:endParaRPr lang="en-US" dirty="0"/>
           </a:p>
         </p:txBody>
       </p:sp>
@@ -1373,7 +1376,7 @@
           </a:lstStyle>
           <a:p>
             <a:pPr algn="ctr" eaLnBrk="1" latinLnBrk="0" hangingPunct="1"/>
-            <a:endParaRPr kumimoji="0" lang="en-US"/>
+            <a:endParaRPr kumimoji="0" lang="en-US" dirty="0"/>
           </a:p>
         </p:txBody>
       </p:sp>
@@ -1587,7 +1590,7 @@
               <a:extLst/>
             </a:lstStyle>
             <a:p>
-              <a:endParaRPr kumimoji="0" lang="en-US"/>
+              <a:endParaRPr kumimoji="0" lang="en-US" dirty="0"/>
             </a:p>
           </p:txBody>
         </p:sp>
@@ -1669,7 +1672,7 @@
               <a:extLst/>
             </a:lstStyle>
             <a:p>
-              <a:endParaRPr kumimoji="0" lang="en-US"/>
+              <a:endParaRPr kumimoji="0" lang="en-US" dirty="0"/>
             </a:p>
           </p:txBody>
         </p:sp>
@@ -1829,7 +1832,7 @@
             </a:lstStyle>
             <a:p>
               <a:pPr algn="ctr" eaLnBrk="1" latinLnBrk="0" hangingPunct="1"/>
-              <a:endParaRPr kumimoji="0" lang="en-US"/>
+              <a:endParaRPr kumimoji="0" lang="en-US" dirty="0"/>
             </a:p>
           </p:txBody>
         </p:sp>
@@ -1916,7 +1919,7 @@
               <a:pPr/>
               <a:t>10/11/2009</a:t>
             </a:fld>
-            <a:endParaRPr lang="en-US"/>
+            <a:endParaRPr lang="en-US" dirty="0"/>
           </a:p>
         </p:txBody>
       </p:sp>
@@ -1946,7 +1949,7 @@
             <a:extLst/>
           </a:lstStyle>
           <a:p>
-            <a:endParaRPr lang="en-US"/>
+            <a:endParaRPr lang="en-US" dirty="0"/>
           </a:p>
         </p:txBody>
       </p:sp>
@@ -1979,7 +1982,7 @@
               <a:pPr/>
               <a:t>‹#›</a:t>
             </a:fld>
-            <a:endParaRPr lang="en-US"/>
+            <a:endParaRPr lang="en-US" dirty="0"/>
           </a:p>
         </p:txBody>
       </p:sp>
@@ -2114,7 +2117,7 @@
               <a:pPr/>
               <a:t>10/11/2009</a:t>
             </a:fld>
-            <a:endParaRPr lang="en-US"/>
+            <a:endParaRPr lang="en-US" dirty="0"/>
           </a:p>
         </p:txBody>
       </p:sp>
@@ -2135,7 +2138,7 @@
             <a:extLst/>
           </a:lstStyle>
           <a:p>
-            <a:endParaRPr lang="en-US"/>
+            <a:endParaRPr lang="en-US" dirty="0"/>
           </a:p>
         </p:txBody>
       </p:sp>
@@ -2161,7 +2164,7 @@
               <a:pPr/>
               <a:t>‹#›</a:t>
             </a:fld>
-            <a:endParaRPr lang="en-US"/>
+            <a:endParaRPr lang="en-US" dirty="0"/>
           </a:p>
         </p:txBody>
       </p:sp>
@@ -2301,7 +2304,7 @@
               <a:pPr/>
               <a:t>10/11/2009</a:t>
             </a:fld>
-            <a:endParaRPr lang="en-US"/>
+            <a:endParaRPr lang="en-US" dirty="0"/>
           </a:p>
         </p:txBody>
       </p:sp>
@@ -2322,7 +2325,7 @@
             <a:extLst/>
           </a:lstStyle>
           <a:p>
-            <a:endParaRPr lang="en-US"/>
+            <a:endParaRPr lang="en-US" dirty="0"/>
           </a:p>
         </p:txBody>
       </p:sp>
@@ -2348,7 +2351,7 @@
               <a:pPr/>
               <a:t>‹#›</a:t>
             </a:fld>
-            <a:endParaRPr lang="en-US"/>
+            <a:endParaRPr lang="en-US" dirty="0"/>
           </a:p>
         </p:txBody>
       </p:sp>
@@ -2453,7 +2456,7 @@
               <a:pPr/>
               <a:t>10/11/2009</a:t>
             </a:fld>
-            <a:endParaRPr lang="en-US"/>
+            <a:endParaRPr lang="en-US" dirty="0"/>
           </a:p>
         </p:txBody>
       </p:sp>
@@ -2474,7 +2477,7 @@
             <a:extLst/>
           </a:lstStyle>
           <a:p>
-            <a:endParaRPr lang="en-US"/>
+            <a:endParaRPr lang="en-US" dirty="0"/>
           </a:p>
         </p:txBody>
       </p:sp>
@@ -2500,7 +2503,7 @@
               <a:pPr/>
               <a:t>‹#›</a:t>
             </a:fld>
-            <a:endParaRPr lang="en-US"/>
+            <a:endParaRPr lang="en-US" dirty="0"/>
           </a:p>
         </p:txBody>
       </p:sp>
@@ -2710,7 +2713,7 @@
               <a:pPr/>
               <a:t>10/11/2009</a:t>
             </a:fld>
-            <a:endParaRPr lang="en-US"/>
+            <a:endParaRPr lang="en-US" dirty="0"/>
           </a:p>
         </p:txBody>
       </p:sp>
@@ -2731,7 +2734,7 @@
             <a:extLst/>
           </a:lstStyle>
           <a:p>
-            <a:endParaRPr lang="en-US"/>
+            <a:endParaRPr lang="en-US" dirty="0"/>
           </a:p>
         </p:txBody>
       </p:sp>
@@ -2757,7 +2760,7 @@
               <a:pPr/>
               <a:t>‹#›</a:t>
             </a:fld>
-            <a:endParaRPr lang="en-US"/>
+            <a:endParaRPr lang="en-US" dirty="0"/>
           </a:p>
         </p:txBody>
       </p:sp>
@@ -2837,7 +2840,7 @@
           </a:lstStyle>
           <a:p>
             <a:pPr algn="l" eaLnBrk="1" latinLnBrk="0" hangingPunct="1"/>
-            <a:endParaRPr kumimoji="0" lang="en-US"/>
+            <a:endParaRPr kumimoji="0" lang="en-US" dirty="0"/>
           </a:p>
         </p:txBody>
       </p:sp>
@@ -2917,7 +2920,7 @@
           </a:lstStyle>
           <a:p>
             <a:pPr algn="l" eaLnBrk="1" latinLnBrk="0" hangingPunct="1"/>
-            <a:endParaRPr kumimoji="0" lang="en-US"/>
+            <a:endParaRPr kumimoji="0" lang="en-US" dirty="0"/>
           </a:p>
         </p:txBody>
       </p:sp>
@@ -3121,7 +3124,7 @@
               <a:pPr/>
               <a:t>10/11/2009</a:t>
             </a:fld>
-            <a:endParaRPr lang="en-US"/>
+            <a:endParaRPr lang="en-US" dirty="0"/>
           </a:p>
         </p:txBody>
       </p:sp>
@@ -3142,7 +3145,7 @@
             <a:extLst/>
           </a:lstStyle>
           <a:p>
-            <a:endParaRPr lang="en-US"/>
+            <a:endParaRPr lang="en-US" dirty="0"/>
           </a:p>
         </p:txBody>
       </p:sp>
@@ -3168,7 +3171,7 @@
               <a:pPr/>
               <a:t>‹#›</a:t>
             </a:fld>
-            <a:endParaRPr lang="en-US"/>
+            <a:endParaRPr lang="en-US" dirty="0"/>
           </a:p>
         </p:txBody>
       </p:sp>
@@ -3569,7 +3572,7 @@
               <a:pPr/>
               <a:t>10/11/2009</a:t>
             </a:fld>
-            <a:endParaRPr lang="en-US"/>
+            <a:endParaRPr lang="en-US" dirty="0"/>
           </a:p>
         </p:txBody>
       </p:sp>
@@ -3590,7 +3593,7 @@
             <a:extLst/>
           </a:lstStyle>
           <a:p>
-            <a:endParaRPr lang="en-US"/>
+            <a:endParaRPr lang="en-US" dirty="0"/>
           </a:p>
         </p:txBody>
       </p:sp>
@@ -3616,7 +3619,7 @@
               <a:pPr/>
               <a:t>‹#›</a:t>
             </a:fld>
-            <a:endParaRPr lang="en-US"/>
+            <a:endParaRPr lang="en-US" dirty="0"/>
           </a:p>
         </p:txBody>
       </p:sp>
@@ -3672,7 +3675,7 @@
               <a:pPr/>
               <a:t>10/11/2009</a:t>
             </a:fld>
-            <a:endParaRPr lang="en-US"/>
+            <a:endParaRPr lang="en-US" dirty="0"/>
           </a:p>
         </p:txBody>
       </p:sp>
@@ -3693,7 +3696,7 @@
             <a:extLst/>
           </a:lstStyle>
           <a:p>
-            <a:endParaRPr lang="en-US"/>
+            <a:endParaRPr lang="en-US" dirty="0"/>
           </a:p>
         </p:txBody>
       </p:sp>
@@ -3719,7 +3722,7 @@
               <a:pPr/>
               <a:t>‹#›</a:t>
             </a:fld>
-            <a:endParaRPr lang="en-US"/>
+            <a:endParaRPr lang="en-US" dirty="0"/>
           </a:p>
         </p:txBody>
       </p:sp>
@@ -3795,7 +3798,7 @@
               <a:pPr/>
               <a:t>10/11/2009</a:t>
             </a:fld>
-            <a:endParaRPr lang="en-US"/>
+            <a:endParaRPr lang="en-US" dirty="0"/>
           </a:p>
         </p:txBody>
       </p:sp>
@@ -3816,7 +3819,7 @@
             <a:extLst/>
           </a:lstStyle>
           <a:p>
-            <a:endParaRPr lang="en-US"/>
+            <a:endParaRPr lang="en-US" dirty="0"/>
           </a:p>
         </p:txBody>
       </p:sp>
@@ -3842,7 +3845,7 @@
               <a:pPr/>
               <a:t>‹#›</a:t>
             </a:fld>
-            <a:endParaRPr lang="en-US"/>
+            <a:endParaRPr lang="en-US" dirty="0"/>
           </a:p>
         </p:txBody>
       </p:sp>
@@ -4071,7 +4074,7 @@
               <a:pPr/>
               <a:t>10/11/2009</a:t>
             </a:fld>
-            <a:endParaRPr lang="en-US"/>
+            <a:endParaRPr lang="en-US" dirty="0"/>
           </a:p>
         </p:txBody>
       </p:sp>
@@ -4092,7 +4095,7 @@
             <a:extLst/>
           </a:lstStyle>
           <a:p>
-            <a:endParaRPr lang="en-US"/>
+            <a:endParaRPr lang="en-US" dirty="0"/>
           </a:p>
         </p:txBody>
       </p:sp>
@@ -4118,7 +4121,7 @@
               <a:pPr/>
               <a:t>‹#›</a:t>
             </a:fld>
-            <a:endParaRPr lang="en-US"/>
+            <a:endParaRPr lang="en-US" dirty="0"/>
           </a:p>
         </p:txBody>
       </p:sp>
@@ -4242,7 +4245,7 @@
           </a:lstStyle>
           <a:p>
             <a:r>
-              <a:rPr kumimoji="0" lang="en-US" smtClean="0"/>
+              <a:rPr kumimoji="0" lang="en-US" dirty="0" smtClean="0"/>
               <a:t>Click icon to add picture</a:t>
             </a:r>
             <a:endParaRPr kumimoji="0" lang="en-US" dirty="0"/>
@@ -4278,7 +4281,7 @@
               <a:pPr/>
               <a:t>10/11/2009</a:t>
             </a:fld>
-            <a:endParaRPr lang="en-US"/>
+            <a:endParaRPr lang="en-US" dirty="0"/>
           </a:p>
         </p:txBody>
       </p:sp>
@@ -4311,7 +4314,7 @@
             <a:extLst/>
           </a:lstStyle>
           <a:p>
-            <a:endParaRPr lang="en-US"/>
+            <a:endParaRPr lang="en-US" dirty="0"/>
           </a:p>
         </p:txBody>
       </p:sp>
@@ -4344,7 +4347,7 @@
               <a:pPr/>
               <a:t>‹#›</a:t>
             </a:fld>
-            <a:endParaRPr lang="en-US"/>
+            <a:endParaRPr lang="en-US" dirty="0"/>
           </a:p>
         </p:txBody>
       </p:sp>
@@ -4476,7 +4479,7 @@
             <a:extLst/>
           </a:lstStyle>
           <a:p>
-            <a:endParaRPr kumimoji="0" lang="en-US"/>
+            <a:endParaRPr kumimoji="0" lang="en-US" dirty="0"/>
           </a:p>
         </p:txBody>
       </p:sp>
@@ -4558,7 +4561,7 @@
             <a:extLst/>
           </a:lstStyle>
           <a:p>
-            <a:endParaRPr kumimoji="0" lang="en-US"/>
+            <a:endParaRPr kumimoji="0" lang="en-US" dirty="0"/>
           </a:p>
         </p:txBody>
       </p:sp>
@@ -4669,7 +4672,7 @@
           </a:lstStyle>
           <a:p>
             <a:pPr algn="ctr" eaLnBrk="1" latinLnBrk="0" hangingPunct="1"/>
-            <a:endParaRPr kumimoji="0" lang="en-US"/>
+            <a:endParaRPr kumimoji="0" lang="en-US" dirty="0"/>
           </a:p>
         </p:txBody>
       </p:sp>
@@ -4802,7 +4805,7 @@
           </a:lstStyle>
           <a:p>
             <a:pPr algn="l" eaLnBrk="1" latinLnBrk="0" hangingPunct="1"/>
-            <a:endParaRPr kumimoji="0" lang="en-US"/>
+            <a:endParaRPr kumimoji="0" lang="en-US" dirty="0"/>
           </a:p>
         </p:txBody>
       </p:sp>
@@ -4882,7 +4885,7 @@
           </a:lstStyle>
           <a:p>
             <a:pPr algn="l" eaLnBrk="1" latinLnBrk="0" hangingPunct="1"/>
-            <a:endParaRPr kumimoji="0" lang="en-US"/>
+            <a:endParaRPr kumimoji="0" lang="en-US" dirty="0"/>
           </a:p>
         </p:txBody>
       </p:sp>
@@ -4996,7 +4999,7 @@
             <a:extLst/>
           </a:lstStyle>
           <a:p>
-            <a:endParaRPr kumimoji="0" lang="en-US"/>
+            <a:endParaRPr kumimoji="0" lang="en-US" dirty="0"/>
           </a:p>
         </p:txBody>
       </p:sp>
@@ -5078,7 +5081,7 @@
             <a:extLst/>
           </a:lstStyle>
           <a:p>
-            <a:endParaRPr kumimoji="0" lang="en-US"/>
+            <a:endParaRPr kumimoji="0" lang="en-US" dirty="0"/>
           </a:p>
         </p:txBody>
       </p:sp>
@@ -5189,7 +5192,7 @@
           </a:lstStyle>
           <a:p>
             <a:pPr algn="ctr" eaLnBrk="1" latinLnBrk="0" hangingPunct="1"/>
-            <a:endParaRPr kumimoji="0" lang="en-US"/>
+            <a:endParaRPr kumimoji="0" lang="en-US" dirty="0"/>
           </a:p>
         </p:txBody>
       </p:sp>
@@ -5389,7 +5392,7 @@
               <a:pPr/>
               <a:t>10/11/2009</a:t>
             </a:fld>
-            <a:endParaRPr lang="en-US"/>
+            <a:endParaRPr lang="en-US" dirty="0"/>
           </a:p>
         </p:txBody>
       </p:sp>
@@ -5425,7 +5428,7 @@
             <a:extLst/>
           </a:lstStyle>
           <a:p>
-            <a:endParaRPr lang="en-US"/>
+            <a:endParaRPr lang="en-US" dirty="0"/>
           </a:p>
         </p:txBody>
       </p:sp>
@@ -5466,7 +5469,7 @@
               <a:pPr/>
               <a:t>‹#›</a:t>
             </a:fld>
-            <a:endParaRPr lang="en-US"/>
+            <a:endParaRPr lang="en-US" dirty="0"/>
           </a:p>
         </p:txBody>
       </p:sp>
@@ -5811,12 +5814,8 @@
           <a:lstStyle/>
           <a:p>
             <a:r>
-              <a:rPr lang="en-US" dirty="0" err="1" smtClean="0"/>
-              <a:t>NoteShare</a:t>
-            </a:r>
-            <a:r>
               <a:rPr lang="en-US" dirty="0" smtClean="0"/>
-              <a:t> System Architecture</a:t>
+              <a:t>NoteShare System Architecture</a:t>
             </a:r>
             <a:endParaRPr lang="en-US" dirty="0"/>
           </a:p>
@@ -5847,13 +5846,8 @@
           <a:p>
             <a:r>
               <a:rPr lang="en-US" dirty="0" smtClean="0"/>
-              <a:t>Nathan </a:t>
-            </a:r>
-            <a:r>
-              <a:rPr lang="en-US" dirty="0" err="1" smtClean="0"/>
-              <a:t>Fritze</a:t>
-            </a:r>
-            <a:endParaRPr lang="en-US" dirty="0" smtClean="0"/>
+              <a:t>Nathan Fritze</a:t>
+            </a:r>
           </a:p>
           <a:p>
             <a:r>
@@ -5869,12 +5863,8 @@
           </a:p>
           <a:p>
             <a:r>
-              <a:rPr lang="en-US" dirty="0" err="1" smtClean="0"/>
-              <a:t>Satpreet</a:t>
-            </a:r>
-            <a:r>
               <a:rPr lang="en-US" dirty="0" smtClean="0"/>
-              <a:t> Singh</a:t>
+              <a:t>Satpreet Singh</a:t>
             </a:r>
           </a:p>
         </p:txBody>
@@ -5906,6 +5896,258 @@
       </p:grpSpPr>
       <p:sp>
         <p:nvSpPr>
+          <p:cNvPr id="2" name="Content Placeholder 1"/>
+          <p:cNvSpPr>
+            <a:spLocks noGrp="1"/>
+          </p:cNvSpPr>
+          <p:nvPr>
+            <p:ph idx="1"/>
+          </p:nvPr>
+        </p:nvSpPr>
+        <p:spPr/>
+        <p:txBody>
+          <a:bodyPr/>
+          <a:lstStyle/>
+          <a:p>
+            <a:endParaRPr lang="en-US" dirty="0"/>
+          </a:p>
+        </p:txBody>
+      </p:sp>
+      <p:sp>
+        <p:nvSpPr>
+          <p:cNvPr id="3" name="Title 2"/>
+          <p:cNvSpPr>
+            <a:spLocks noGrp="1"/>
+          </p:cNvSpPr>
+          <p:nvPr>
+            <p:ph type="title"/>
+          </p:nvPr>
+        </p:nvSpPr>
+        <p:spPr/>
+        <p:txBody>
+          <a:bodyPr/>
+          <a:lstStyle/>
+          <a:p>
+            <a:r>
+              <a:rPr lang="en-US" dirty="0" smtClean="0"/>
+              <a:t>Sequence Diagram</a:t>
+            </a:r>
+            <a:endParaRPr lang="en-US" dirty="0"/>
+          </a:p>
+        </p:txBody>
+      </p:sp>
+      <p:pic>
+        <p:nvPicPr>
+          <p:cNvPr id="3074" name="Picture 2" descr="C:\Users\Jonathan\Desktop\dg3drhmg_3fq8kgbr7_b.png"/>
+          <p:cNvPicPr>
+            <a:picLocks noChangeAspect="1" noChangeArrowheads="1"/>
+          </p:cNvPicPr>
+          <p:nvPr/>
+        </p:nvPicPr>
+        <p:blipFill>
+          <a:blip r:embed="rId3" cstate="print"/>
+          <a:srcRect/>
+          <a:stretch>
+            <a:fillRect/>
+          </a:stretch>
+        </p:blipFill>
+        <p:spPr bwMode="auto">
+          <a:xfrm>
+            <a:off x="143473" y="1752600"/>
+            <a:ext cx="9000527" cy="2590800"/>
+          </a:xfrm>
+          <a:prstGeom prst="rect">
+            <a:avLst/>
+          </a:prstGeom>
+          <a:noFill/>
+        </p:spPr>
+      </p:pic>
+    </p:spTree>
+  </p:cSld>
+  <p:clrMapOvr>
+    <a:masterClrMapping/>
+  </p:clrMapOvr>
+  <p:timing>
+    <p:tnLst>
+      <p:par>
+        <p:cTn id="1" dur="indefinite" restart="never" nodeType="tmRoot"/>
+      </p:par>
+    </p:tnLst>
+  </p:timing>
+</p:sld>
+</file>
+
+<file path=ppt/slides/slide11.xml><?xml version="1.0" encoding="utf-8"?>
+<p:sld xmlns:a="http://schemas.openxmlformats.org/drawingml/2006/main" xmlns:r="http://schemas.openxmlformats.org/officeDocument/2006/relationships" xmlns:p="http://schemas.openxmlformats.org/presentationml/2006/main">
+  <p:cSld>
+    <p:spTree>
+      <p:nvGrpSpPr>
+        <p:cNvPr id="1" name=""/>
+        <p:cNvGrpSpPr/>
+        <p:nvPr/>
+      </p:nvGrpSpPr>
+      <p:grpSpPr>
+        <a:xfrm>
+          <a:off x="0" y="0"/>
+          <a:ext cx="0" cy="0"/>
+          <a:chOff x="0" y="0"/>
+          <a:chExt cx="0" cy="0"/>
+        </a:xfrm>
+      </p:grpSpPr>
+      <p:pic>
+        <p:nvPicPr>
+          <p:cNvPr id="4" name="Content Placeholder 3" descr="ERdia.jpg"/>
+          <p:cNvPicPr>
+            <a:picLocks noGrp="1" noChangeAspect="1"/>
+          </p:cNvPicPr>
+          <p:nvPr>
+            <p:ph idx="1"/>
+          </p:nvPr>
+        </p:nvPicPr>
+        <p:blipFill>
+          <a:blip r:embed="rId3" cstate="print"/>
+          <a:stretch>
+            <a:fillRect/>
+          </a:stretch>
+        </p:blipFill>
+        <p:spPr>
+          <a:xfrm>
+            <a:off x="4200049" y="152400"/>
+            <a:ext cx="4562951" cy="6476048"/>
+          </a:xfrm>
+        </p:spPr>
+      </p:pic>
+      <p:sp>
+        <p:nvSpPr>
+          <p:cNvPr id="3" name="Title 2"/>
+          <p:cNvSpPr>
+            <a:spLocks noGrp="1"/>
+          </p:cNvSpPr>
+          <p:nvPr>
+            <p:ph type="title"/>
+          </p:nvPr>
+        </p:nvSpPr>
+        <p:spPr/>
+        <p:txBody>
+          <a:bodyPr/>
+          <a:lstStyle/>
+          <a:p>
+            <a:r>
+              <a:rPr lang="en-US" dirty="0" smtClean="0"/>
+              <a:t>ER Diagram</a:t>
+            </a:r>
+            <a:endParaRPr lang="en-US" dirty="0"/>
+          </a:p>
+        </p:txBody>
+      </p:sp>
+    </p:spTree>
+  </p:cSld>
+  <p:clrMapOvr>
+    <a:masterClrMapping/>
+  </p:clrMapOvr>
+  <p:timing>
+    <p:tnLst>
+      <p:par>
+        <p:cTn id="1" dur="indefinite" restart="never" nodeType="tmRoot"/>
+      </p:par>
+    </p:tnLst>
+  </p:timing>
+</p:sld>
+</file>
+
+<file path=ppt/slides/slide12.xml><?xml version="1.0" encoding="utf-8"?>
+<p:sld xmlns:a="http://schemas.openxmlformats.org/drawingml/2006/main" xmlns:r="http://schemas.openxmlformats.org/officeDocument/2006/relationships" xmlns:p="http://schemas.openxmlformats.org/presentationml/2006/main">
+  <p:cSld>
+    <p:spTree>
+      <p:nvGrpSpPr>
+        <p:cNvPr id="1" name=""/>
+        <p:cNvGrpSpPr/>
+        <p:nvPr/>
+      </p:nvGrpSpPr>
+      <p:grpSpPr>
+        <a:xfrm>
+          <a:off x="0" y="0"/>
+          <a:ext cx="0" cy="0"/>
+          <a:chOff x="0" y="0"/>
+          <a:chExt cx="0" cy="0"/>
+        </a:xfrm>
+      </p:grpSpPr>
+      <p:sp>
+        <p:nvSpPr>
+          <p:cNvPr id="2" name="Content Placeholder 1"/>
+          <p:cNvSpPr>
+            <a:spLocks noGrp="1"/>
+          </p:cNvSpPr>
+          <p:nvPr>
+            <p:ph idx="1"/>
+          </p:nvPr>
+        </p:nvSpPr>
+        <p:spPr/>
+        <p:txBody>
+          <a:bodyPr/>
+          <a:lstStyle/>
+          <a:p>
+            <a:endParaRPr lang="en-US" dirty="0"/>
+          </a:p>
+        </p:txBody>
+      </p:sp>
+      <p:sp>
+        <p:nvSpPr>
+          <p:cNvPr id="3" name="Title 2"/>
+          <p:cNvSpPr>
+            <a:spLocks noGrp="1"/>
+          </p:cNvSpPr>
+          <p:nvPr>
+            <p:ph type="title"/>
+          </p:nvPr>
+        </p:nvSpPr>
+        <p:spPr/>
+        <p:txBody>
+          <a:bodyPr/>
+          <a:lstStyle/>
+          <a:p>
+            <a:r>
+              <a:rPr lang="en-US" dirty="0" smtClean="0"/>
+              <a:t>Interfaces</a:t>
+            </a:r>
+            <a:endParaRPr lang="en-US" dirty="0"/>
+          </a:p>
+        </p:txBody>
+      </p:sp>
+    </p:spTree>
+  </p:cSld>
+  <p:clrMapOvr>
+    <a:masterClrMapping/>
+  </p:clrMapOvr>
+  <p:timing>
+    <p:tnLst>
+      <p:par>
+        <p:cTn id="1" dur="indefinite" restart="never" nodeType="tmRoot"/>
+      </p:par>
+    </p:tnLst>
+  </p:timing>
+</p:sld>
+</file>
+
+<file path=ppt/slides/slide13.xml><?xml version="1.0" encoding="utf-8"?>
+<p:sld xmlns:a="http://schemas.openxmlformats.org/drawingml/2006/main" xmlns:r="http://schemas.openxmlformats.org/officeDocument/2006/relationships" xmlns:p="http://schemas.openxmlformats.org/presentationml/2006/main">
+  <p:cSld>
+    <p:spTree>
+      <p:nvGrpSpPr>
+        <p:cNvPr id="1" name=""/>
+        <p:cNvGrpSpPr/>
+        <p:nvPr/>
+      </p:nvGrpSpPr>
+      <p:grpSpPr>
+        <a:xfrm>
+          <a:off x="0" y="0"/>
+          <a:ext cx="0" cy="0"/>
+          <a:chOff x="0" y="0"/>
+          <a:chExt cx="0" cy="0"/>
+        </a:xfrm>
+      </p:grpSpPr>
+      <p:sp>
+        <p:nvSpPr>
           <p:cNvPr id="3" name="Title 2"/>
           <p:cNvSpPr>
             <a:spLocks noGrp="1"/>
@@ -5937,6 +6179,13 @@
   <p:clrMapOvr>
     <a:masterClrMapping/>
   </p:clrMapOvr>
+  <p:timing>
+    <p:tnLst>
+      <p:par>
+        <p:cTn id="1" dur="indefinite" restart="never" nodeType="tmRoot"/>
+      </p:par>
+    </p:tnLst>
+  </p:timing>
 </p:sld>
 </file>
 
@@ -5974,20 +6223,35 @@
           <a:p>
             <a:r>
               <a:rPr lang="en-US" dirty="0" smtClean="0"/>
-              <a:t>High-Level System Architecture</a:t>
+              <a:t>Architectural Goals</a:t>
             </a:r>
           </a:p>
           <a:p>
             <a:r>
               <a:rPr lang="en-US" dirty="0" smtClean="0"/>
-              <a:t>Component Overview</a:t>
-            </a:r>
+              <a:t>High-Level Facebook Architecture</a:t>
+            </a:r>
+            <a:endParaRPr lang="en-US" dirty="0" smtClean="0"/>
           </a:p>
           <a:p>
             <a:r>
               <a:rPr lang="en-US" dirty="0" smtClean="0"/>
-              <a:t>Component Level View/Interfaces</a:t>
-            </a:r>
+              <a:t>Architecture Overview</a:t>
+            </a:r>
+          </a:p>
+          <a:p>
+            <a:r>
+              <a:rPr lang="en-US" dirty="0" smtClean="0"/>
+              <a:t>Mock-ups</a:t>
+            </a:r>
+            <a:endParaRPr lang="en-US" dirty="0" smtClean="0"/>
+          </a:p>
+          <a:p>
+            <a:r>
+              <a:rPr lang="en-US" dirty="0" smtClean="0"/>
+              <a:t>Essential Use Case Example</a:t>
+            </a:r>
+            <a:endParaRPr lang="en-US" dirty="0" smtClean="0"/>
           </a:p>
           <a:p>
             <a:r>
@@ -5998,15 +6262,24 @@
           <a:p>
             <a:r>
               <a:rPr lang="en-US" dirty="0" smtClean="0"/>
-              <a:t>ER Diagram</a:t>
-            </a:r>
-          </a:p>
-          <a:p>
+              <a:t>Component Level </a:t>
+            </a:r>
             <a:r>
               <a:rPr lang="en-US" dirty="0" smtClean="0"/>
-              <a:t>Mock-ups</a:t>
-            </a:r>
-            <a:endParaRPr lang="en-US" dirty="0"/>
+              <a:t>View/Interfaces</a:t>
+            </a:r>
+            <a:endParaRPr lang="en-US" dirty="0" smtClean="0"/>
+          </a:p>
+          <a:p>
+            <a:r>
+              <a:rPr lang="en-US" dirty="0" smtClean="0"/>
+              <a:t>ER </a:t>
+            </a:r>
+            <a:r>
+              <a:rPr lang="en-US" dirty="0" smtClean="0"/>
+              <a:t>Diagram</a:t>
+            </a:r>
+            <a:endParaRPr lang="en-US" dirty="0" smtClean="0"/>
           </a:p>
         </p:txBody>
       </p:sp>
@@ -6058,37 +6331,14 @@
           <a:chExt cx="0" cy="0"/>
         </a:xfrm>
       </p:grpSpPr>
-      <p:pic>
-        <p:nvPicPr>
-          <p:cNvPr id="4" name="Content Placeholder 3" descr="NoteShare_Architecture0.gif"/>
-          <p:cNvPicPr>
-            <a:picLocks noGrp="1" noChangeAspect="1"/>
-          </p:cNvPicPr>
+      <p:sp>
+        <p:nvSpPr>
+          <p:cNvPr id="2" name="Content Placeholder 1"/>
+          <p:cNvSpPr>
+            <a:spLocks noGrp="1"/>
+          </p:cNvSpPr>
           <p:nvPr>
             <p:ph idx="1"/>
-          </p:nvPr>
-        </p:nvPicPr>
-        <p:blipFill>
-          <a:blip r:embed="rId3" cstate="print"/>
-          <a:stretch>
-            <a:fillRect/>
-          </a:stretch>
-        </p:blipFill>
-        <p:spPr>
-          <a:xfrm>
-            <a:off x="1554692" y="1481138"/>
-            <a:ext cx="6034616" cy="4525962"/>
-          </a:xfrm>
-        </p:spPr>
-      </p:pic>
-      <p:sp>
-        <p:nvSpPr>
-          <p:cNvPr id="3" name="Title 2"/>
-          <p:cNvSpPr>
-            <a:spLocks noGrp="1"/>
-          </p:cNvSpPr>
-          <p:nvPr>
-            <p:ph type="title"/>
           </p:nvPr>
         </p:nvSpPr>
         <p:spPr/>
@@ -6098,7 +6348,60 @@
           <a:p>
             <a:r>
               <a:rPr lang="en-US" dirty="0" smtClean="0"/>
-              <a:t>High-Level System Architecture</a:t>
+              <a:t>Facebook Interoperability and Usability</a:t>
+            </a:r>
+          </a:p>
+          <a:p>
+            <a:pPr lvl="1"/>
+            <a:r>
+              <a:rPr lang="en-US" dirty="0" smtClean="0"/>
+              <a:t>Common functionality should behave like a Facebook element</a:t>
+            </a:r>
+          </a:p>
+          <a:p>
+            <a:pPr lvl="1"/>
+            <a:r>
+              <a:rPr lang="en-US" dirty="0" smtClean="0"/>
+              <a:t>Integration with Facebook social network and features</a:t>
+            </a:r>
+          </a:p>
+          <a:p>
+            <a:r>
+              <a:rPr lang="en-US" dirty="0" smtClean="0"/>
+              <a:t>Portability</a:t>
+            </a:r>
+          </a:p>
+          <a:p>
+            <a:pPr lvl="1"/>
+            <a:r>
+              <a:rPr lang="en-US" dirty="0" smtClean="0"/>
+              <a:t>Available on all platforms supported by Facebook</a:t>
+            </a:r>
+          </a:p>
+          <a:p>
+            <a:pPr lvl="1"/>
+            <a:endParaRPr lang="en-US" dirty="0"/>
+          </a:p>
+        </p:txBody>
+      </p:sp>
+      <p:sp>
+        <p:nvSpPr>
+          <p:cNvPr id="3" name="Title 2"/>
+          <p:cNvSpPr>
+            <a:spLocks noGrp="1"/>
+          </p:cNvSpPr>
+          <p:nvPr>
+            <p:ph type="title"/>
+          </p:nvPr>
+        </p:nvSpPr>
+        <p:spPr/>
+        <p:txBody>
+          <a:bodyPr/>
+          <a:lstStyle/>
+          <a:p>
+            <a:r>
+              <a:rPr lang="en-US" dirty="0" smtClean="0"/>
+              <a:t>Architectural Goals</a:t>
             </a:r>
             <a:endParaRPr lang="en-US" dirty="0"/>
           </a:p>
@@ -6131,12 +6434,41 @@
       </p:grpSpPr>
       <p:sp>
         <p:nvSpPr>
-          <p:cNvPr id="2" name="Content Placeholder 1"/>
-          <p:cNvSpPr>
-            <a:spLocks noGrp="1"/>
-          </p:cNvSpPr>
-          <p:nvPr>
-            <p:ph idx="1"/>
+          <p:cNvPr id="3" name="Title 2"/>
+          <p:cNvSpPr>
+            <a:spLocks noGrp="1"/>
+          </p:cNvSpPr>
+          <p:nvPr>
+            <p:ph type="title"/>
+          </p:nvPr>
+        </p:nvSpPr>
+        <p:spPr/>
+        <p:txBody>
+          <a:bodyPr>
+            <a:normAutofit fontScale="90000"/>
+          </a:bodyPr>
+          <a:lstStyle/>
+          <a:p>
+            <a:r>
+              <a:rPr lang="en-US" dirty="0" smtClean="0"/>
+              <a:t>High-Level </a:t>
+            </a:r>
+            <a:r>
+              <a:rPr lang="en-US" dirty="0" smtClean="0"/>
+              <a:t>Facebook Interaction Architecture</a:t>
+            </a:r>
+            <a:endParaRPr lang="en-US" dirty="0"/>
+          </a:p>
+        </p:txBody>
+      </p:sp>
+      <p:sp>
+        <p:nvSpPr>
+          <p:cNvPr id="6" name="Text Placeholder 5"/>
+          <p:cNvSpPr>
+            <a:spLocks noGrp="1"/>
+          </p:cNvSpPr>
+          <p:nvPr>
+            <p:ph type="body" idx="1"/>
           </p:nvPr>
         </p:nvSpPr>
         <p:spPr/>
@@ -6144,18 +6476,22 @@
           <a:bodyPr/>
           <a:lstStyle/>
           <a:p>
-            <a:endParaRPr lang="en-US" dirty="0" smtClean="0"/>
-          </a:p>
-        </p:txBody>
-      </p:sp>
-      <p:sp>
-        <p:nvSpPr>
-          <p:cNvPr id="3" name="Title 2"/>
-          <p:cNvSpPr>
-            <a:spLocks noGrp="1"/>
-          </p:cNvSpPr>
-          <p:nvPr>
-            <p:ph type="title"/>
+            <a:r>
+              <a:rPr lang="en-US" dirty="0" smtClean="0"/>
+              <a:t>Facebook FBML App</a:t>
+            </a:r>
+            <a:endParaRPr lang="en-US" dirty="0"/>
+          </a:p>
+        </p:txBody>
+      </p:sp>
+      <p:sp>
+        <p:nvSpPr>
+          <p:cNvPr id="7" name="Text Placeholder 6"/>
+          <p:cNvSpPr>
+            <a:spLocks noGrp="1"/>
+          </p:cNvSpPr>
+          <p:nvPr>
+            <p:ph type="body" sz="half" idx="3"/>
           </p:nvPr>
         </p:nvSpPr>
         <p:spPr/>
@@ -6163,9 +6499,79 @@
           <a:bodyPr/>
           <a:lstStyle/>
           <a:p>
+            <a:endParaRPr lang="en-US" dirty="0"/>
+          </a:p>
+        </p:txBody>
+      </p:sp>
+      <p:pic>
+        <p:nvPicPr>
+          <p:cNvPr id="4" name="Content Placeholder 3" descr="NoteShare_Architecture0.gif"/>
+          <p:cNvPicPr>
+            <a:picLocks noGrp="1" noChangeAspect="1"/>
+          </p:cNvPicPr>
+          <p:nvPr>
+            <p:ph sz="quarter" idx="2"/>
+          </p:nvPr>
+        </p:nvPicPr>
+        <p:blipFill>
+          <a:blip r:embed="rId3" cstate="print"/>
+          <a:stretch>
+            <a:fillRect/>
+          </a:stretch>
+        </p:blipFill>
+        <p:spPr>
+          <a:xfrm>
+            <a:off x="457200" y="1900436"/>
+            <a:ext cx="4040188" cy="3030141"/>
+          </a:xfrm>
+        </p:spPr>
+      </p:pic>
+      <p:sp>
+        <p:nvSpPr>
+          <p:cNvPr id="8" name="Content Placeholder 7"/>
+          <p:cNvSpPr>
+            <a:spLocks noGrp="1"/>
+          </p:cNvSpPr>
+          <p:nvPr>
+            <p:ph sz="quarter" idx="4"/>
+          </p:nvPr>
+        </p:nvSpPr>
+        <p:spPr/>
+        <p:txBody>
+          <a:bodyPr>
+            <a:normAutofit fontScale="92500"/>
+          </a:bodyPr>
+          <a:lstStyle/>
+          <a:p>
             <a:r>
               <a:rPr lang="en-US" dirty="0" smtClean="0"/>
-              <a:t>Component Overview</a:t>
+              <a:t>Facebook provides two methods of integrating apps</a:t>
+            </a:r>
+          </a:p>
+          <a:p>
+            <a:pPr lvl="1"/>
+            <a:r>
+              <a:rPr lang="en-US" dirty="0" smtClean="0"/>
+              <a:t>FBML</a:t>
+            </a:r>
+          </a:p>
+          <a:p>
+            <a:pPr lvl="1"/>
+            <a:r>
+              <a:rPr lang="en-US" dirty="0" smtClean="0"/>
+              <a:t>iFrame</a:t>
+            </a:r>
+          </a:p>
+          <a:p>
+            <a:r>
+              <a:rPr lang="en-US" dirty="0" smtClean="0"/>
+              <a:t>FBML apps provide a Facebook centric markup language (look and feel)</a:t>
+            </a:r>
+          </a:p>
+          <a:p>
+            <a:r>
+              <a:rPr lang="en-US" dirty="0" smtClean="0"/>
+              <a:t>Facebook acts as an intermediary between User and NoteShare</a:t>
             </a:r>
             <a:endParaRPr lang="en-US" dirty="0"/>
           </a:p>
@@ -6176,10 +6582,169 @@
   <p:clrMapOvr>
     <a:masterClrMapping/>
   </p:clrMapOvr>
+  <p:timing>
+    <p:tnLst>
+      <p:par>
+        <p:cTn id="1" dur="indefinite" restart="never" nodeType="tmRoot"/>
+      </p:par>
+    </p:tnLst>
+  </p:timing>
 </p:sld>
 </file>
 
 <file path=ppt/slides/slide5.xml><?xml version="1.0" encoding="utf-8"?>
+<p:sld xmlns:a="http://schemas.openxmlformats.org/drawingml/2006/main" xmlns:r="http://schemas.openxmlformats.org/officeDocument/2006/relationships" xmlns:p="http://schemas.openxmlformats.org/presentationml/2006/main">
+  <p:cSld>
+    <p:spTree>
+      <p:nvGrpSpPr>
+        <p:cNvPr id="1" name=""/>
+        <p:cNvGrpSpPr/>
+        <p:nvPr/>
+      </p:nvGrpSpPr>
+      <p:grpSpPr>
+        <a:xfrm>
+          <a:off x="0" y="0"/>
+          <a:ext cx="0" cy="0"/>
+          <a:chOff x="0" y="0"/>
+          <a:chExt cx="0" cy="0"/>
+        </a:xfrm>
+      </p:grpSpPr>
+      <p:sp>
+        <p:nvSpPr>
+          <p:cNvPr id="2" name="Content Placeholder 1"/>
+          <p:cNvSpPr>
+            <a:spLocks noGrp="1"/>
+          </p:cNvSpPr>
+          <p:nvPr>
+            <p:ph idx="1"/>
+          </p:nvPr>
+        </p:nvSpPr>
+        <p:spPr/>
+        <p:txBody>
+          <a:bodyPr>
+            <a:normAutofit lnSpcReduction="10000"/>
+          </a:bodyPr>
+          <a:lstStyle/>
+          <a:p>
+            <a:r>
+              <a:rPr lang="en-US" dirty="0" smtClean="0"/>
+              <a:t>Model-View-Controller Web App</a:t>
+            </a:r>
+          </a:p>
+          <a:p>
+            <a:endParaRPr lang="en-US" dirty="0" smtClean="0"/>
+          </a:p>
+          <a:p>
+            <a:r>
+              <a:rPr lang="en-US" b="1" dirty="0" smtClean="0"/>
+              <a:t>Model</a:t>
+            </a:r>
+          </a:p>
+          <a:p>
+            <a:pPr lvl="1"/>
+            <a:r>
+              <a:rPr lang="en-US" dirty="0" smtClean="0"/>
+              <a:t>Database Abstraction </a:t>
+            </a:r>
+            <a:r>
+              <a:rPr lang="en-US" dirty="0" smtClean="0"/>
+              <a:t>Layer, PHP script</a:t>
+            </a:r>
+          </a:p>
+          <a:p>
+            <a:pPr lvl="1"/>
+            <a:r>
+              <a:rPr lang="en-US" dirty="0" smtClean="0"/>
+              <a:t>MySQL server</a:t>
+            </a:r>
+          </a:p>
+          <a:p>
+            <a:pPr lvl="1"/>
+            <a:r>
+              <a:rPr lang="en-US" dirty="0" smtClean="0"/>
+              <a:t>FQL, Facebook server</a:t>
+            </a:r>
+            <a:endParaRPr lang="en-US" dirty="0" smtClean="0"/>
+          </a:p>
+          <a:p>
+            <a:r>
+              <a:rPr lang="en-US" b="1" dirty="0" smtClean="0"/>
+              <a:t>View</a:t>
+            </a:r>
+          </a:p>
+          <a:p>
+            <a:pPr lvl="1"/>
+            <a:r>
+              <a:rPr lang="en-US" dirty="0" smtClean="0"/>
+              <a:t>Apache served PHP with FBML</a:t>
+            </a:r>
+            <a:endParaRPr lang="en-US" dirty="0" smtClean="0"/>
+          </a:p>
+          <a:p>
+            <a:r>
+              <a:rPr lang="en-US" b="1" dirty="0" smtClean="0"/>
+              <a:t>Controller</a:t>
+            </a:r>
+          </a:p>
+          <a:p>
+            <a:pPr lvl="1"/>
+            <a:r>
+              <a:rPr lang="en-US" dirty="0" smtClean="0"/>
+              <a:t>PHP which handles Facebook user HTTP requests</a:t>
+            </a:r>
+          </a:p>
+          <a:p>
+            <a:pPr lvl="1"/>
+            <a:r>
+              <a:rPr lang="en-US" dirty="0" smtClean="0"/>
+              <a:t>Modifies the Model</a:t>
+            </a:r>
+            <a:endParaRPr lang="en-US" dirty="0" smtClean="0"/>
+          </a:p>
+          <a:p>
+            <a:endParaRPr lang="en-US" dirty="0" smtClean="0"/>
+          </a:p>
+        </p:txBody>
+      </p:sp>
+      <p:sp>
+        <p:nvSpPr>
+          <p:cNvPr id="3" name="Title 2"/>
+          <p:cNvSpPr>
+            <a:spLocks noGrp="1"/>
+          </p:cNvSpPr>
+          <p:nvPr>
+            <p:ph type="title"/>
+          </p:nvPr>
+        </p:nvSpPr>
+        <p:spPr/>
+        <p:txBody>
+          <a:bodyPr/>
+          <a:lstStyle/>
+          <a:p>
+            <a:r>
+              <a:rPr lang="en-US" dirty="0" smtClean="0"/>
+              <a:t>Architecture Overview</a:t>
+            </a:r>
+            <a:endParaRPr lang="en-US" dirty="0"/>
+          </a:p>
+        </p:txBody>
+      </p:sp>
+    </p:spTree>
+  </p:cSld>
+  <p:clrMapOvr>
+    <a:masterClrMapping/>
+  </p:clrMapOvr>
+  <p:timing>
+    <p:tnLst>
+      <p:par>
+        <p:cTn id="1" dur="indefinite" restart="never" nodeType="tmRoot"/>
+      </p:par>
+    </p:tnLst>
+  </p:timing>
+</p:sld>
+</file>
+
+<file path=ppt/slides/slide6.xml><?xml version="1.0" encoding="utf-8"?>
 <p:sld xmlns:a="http://schemas.openxmlformats.org/drawingml/2006/main" xmlns:r="http://schemas.openxmlformats.org/officeDocument/2006/relationships" xmlns:p="http://schemas.openxmlformats.org/presentationml/2006/main">
   <p:cSld>
     <p:spTree>
@@ -6236,7 +6801,7 @@
           <a:p>
             <a:r>
               <a:rPr lang="en-US" dirty="0" smtClean="0"/>
-              <a:t>Component </a:t>
+              <a:t>High-Level Component </a:t>
             </a:r>
             <a:r>
               <a:rPr lang="en-US" dirty="0" smtClean="0"/>
@@ -6246,101 +6811,6 @@
           </a:p>
         </p:txBody>
       </p:sp>
-    </p:spTree>
-  </p:cSld>
-  <p:clrMapOvr>
-    <a:masterClrMapping/>
-  </p:clrMapOvr>
-</p:sld>
-</file>
-
-<file path=ppt/slides/slide6.xml><?xml version="1.0" encoding="utf-8"?>
-<p:sld xmlns:a="http://schemas.openxmlformats.org/drawingml/2006/main" xmlns:r="http://schemas.openxmlformats.org/officeDocument/2006/relationships" xmlns:p="http://schemas.openxmlformats.org/presentationml/2006/main">
-  <p:cSld>
-    <p:spTree>
-      <p:nvGrpSpPr>
-        <p:cNvPr id="1" name=""/>
-        <p:cNvGrpSpPr/>
-        <p:nvPr/>
-      </p:nvGrpSpPr>
-      <p:grpSpPr>
-        <a:xfrm>
-          <a:off x="0" y="0"/>
-          <a:ext cx="0" cy="0"/>
-          <a:chOff x="0" y="0"/>
-          <a:chExt cx="0" cy="0"/>
-        </a:xfrm>
-      </p:grpSpPr>
-      <p:pic>
-        <p:nvPicPr>
-          <p:cNvPr id="4" name="Content Placeholder 3" descr="userHP.jpg"/>
-          <p:cNvPicPr>
-            <a:picLocks noGrp="1" noChangeAspect="1"/>
-          </p:cNvPicPr>
-          <p:nvPr>
-            <p:ph idx="1"/>
-          </p:nvPr>
-        </p:nvPicPr>
-        <p:blipFill>
-          <a:blip r:embed="rId3" cstate="print"/>
-          <a:stretch>
-            <a:fillRect/>
-          </a:stretch>
-        </p:blipFill>
-        <p:spPr>
-          <a:xfrm>
-            <a:off x="2286000" y="1331595"/>
-            <a:ext cx="4480560" cy="2326005"/>
-          </a:xfrm>
-        </p:spPr>
-      </p:pic>
-      <p:sp>
-        <p:nvSpPr>
-          <p:cNvPr id="3" name="Title 2"/>
-          <p:cNvSpPr>
-            <a:spLocks noGrp="1"/>
-          </p:cNvSpPr>
-          <p:nvPr>
-            <p:ph type="title"/>
-          </p:nvPr>
-        </p:nvSpPr>
-        <p:spPr/>
-        <p:txBody>
-          <a:bodyPr/>
-          <a:lstStyle/>
-          <a:p>
-            <a:r>
-              <a:rPr lang="en-US" dirty="0" smtClean="0"/>
-              <a:t>Mock-ups</a:t>
-            </a:r>
-            <a:endParaRPr lang="en-US" dirty="0"/>
-          </a:p>
-        </p:txBody>
-      </p:sp>
-      <p:pic>
-        <p:nvPicPr>
-          <p:cNvPr id="5" name="Picture 4" descr="addcourse.jpg"/>
-          <p:cNvPicPr>
-            <a:picLocks noChangeAspect="1"/>
-          </p:cNvPicPr>
-          <p:nvPr/>
-        </p:nvPicPr>
-        <p:blipFill>
-          <a:blip r:embed="rId4" cstate="print"/>
-          <a:stretch>
-            <a:fillRect/>
-          </a:stretch>
-        </p:blipFill>
-        <p:spPr>
-          <a:xfrm>
-            <a:off x="2286000" y="3810000"/>
-            <a:ext cx="4606290" cy="2143125"/>
-          </a:xfrm>
-          <a:prstGeom prst="rect">
-            <a:avLst/>
-          </a:prstGeom>
-        </p:spPr>
-      </p:pic>
     </p:spTree>
   </p:cSld>
   <p:clrMapOvr>
@@ -6366,14 +6836,44 @@
           <a:chExt cx="0" cy="0"/>
         </a:xfrm>
       </p:grpSpPr>
-      <p:sp>
-        <p:nvSpPr>
-          <p:cNvPr id="2" name="Content Placeholder 1"/>
-          <p:cNvSpPr>
-            <a:spLocks noGrp="1"/>
-          </p:cNvSpPr>
+      <p:pic>
+        <p:nvPicPr>
+          <p:cNvPr id="4" name="Content Placeholder 3" descr="userHP.jpg"/>
+          <p:cNvPicPr>
+            <a:picLocks noGrp="1" noChangeAspect="1"/>
+          </p:cNvPicPr>
           <p:nvPr>
             <p:ph idx="1"/>
+          </p:nvPr>
+        </p:nvPicPr>
+        <p:blipFill>
+          <a:blip r:embed="rId3" cstate="print"/>
+          <a:stretch>
+            <a:fillRect/>
+          </a:stretch>
+        </p:blipFill>
+        <p:spPr>
+          <a:xfrm>
+            <a:off x="304800" y="1219200"/>
+            <a:ext cx="6311680" cy="3276600"/>
+          </a:xfrm>
+          <a:scene3d>
+            <a:camera prst="orthographicFront"/>
+            <a:lightRig rig="threePt" dir="t"/>
+          </a:scene3d>
+          <a:sp3d>
+            <a:bevelT w="165100" prst="coolSlant"/>
+          </a:sp3d>
+        </p:spPr>
+      </p:pic>
+      <p:sp>
+        <p:nvSpPr>
+          <p:cNvPr id="3" name="Title 2"/>
+          <p:cNvSpPr>
+            <a:spLocks noGrp="1"/>
+          </p:cNvSpPr>
+          <p:nvPr>
+            <p:ph type="title"/>
           </p:nvPr>
         </p:nvSpPr>
         <p:spPr/>
@@ -6383,35 +6883,43 @@
           <a:p>
             <a:r>
               <a:rPr lang="en-US" dirty="0" smtClean="0"/>
-              <a:t>There will be more than one…add more slides</a:t>
-            </a:r>
-            <a:endParaRPr lang="en-US" dirty="0"/>
-          </a:p>
-        </p:txBody>
-      </p:sp>
-      <p:sp>
-        <p:nvSpPr>
-          <p:cNvPr id="3" name="Title 2"/>
-          <p:cNvSpPr>
-            <a:spLocks noGrp="1"/>
-          </p:cNvSpPr>
-          <p:nvPr>
-            <p:ph type="title"/>
-          </p:nvPr>
-        </p:nvSpPr>
-        <p:spPr/>
-        <p:txBody>
-          <a:bodyPr/>
-          <a:lstStyle/>
-          <a:p>
-            <a:r>
-              <a:rPr lang="en-US" dirty="0" smtClean="0"/>
-              <a:t>Sequence Diagram</a:t>
-            </a:r>
-            <a:endParaRPr lang="en-US" dirty="0"/>
-          </a:p>
-        </p:txBody>
-      </p:sp>
+              <a:t>Mock-ups</a:t>
+            </a:r>
+            <a:endParaRPr lang="en-US" dirty="0"/>
+          </a:p>
+        </p:txBody>
+      </p:sp>
+      <p:pic>
+        <p:nvPicPr>
+          <p:cNvPr id="5" name="Picture 4" descr="addcourse.jpg"/>
+          <p:cNvPicPr>
+            <a:picLocks noChangeAspect="1"/>
+          </p:cNvPicPr>
+          <p:nvPr/>
+        </p:nvPicPr>
+        <p:blipFill>
+          <a:blip r:embed="rId4" cstate="print"/>
+          <a:stretch>
+            <a:fillRect/>
+          </a:stretch>
+        </p:blipFill>
+        <p:spPr>
+          <a:xfrm>
+            <a:off x="2667000" y="3581400"/>
+            <a:ext cx="6244082" cy="2905125"/>
+          </a:xfrm>
+          <a:prstGeom prst="rect">
+            <a:avLst/>
+          </a:prstGeom>
+          <a:scene3d>
+            <a:camera prst="orthographicFront"/>
+            <a:lightRig rig="threePt" dir="t"/>
+          </a:scene3d>
+          <a:sp3d>
+            <a:bevelT w="165100" prst="coolSlant"/>
+          </a:sp3d>
+        </p:spPr>
+      </p:pic>
     </p:spTree>
   </p:cSld>
   <p:clrMapOvr>
@@ -6437,52 +6945,120 @@
           <a:chExt cx="0" cy="0"/>
         </a:xfrm>
       </p:grpSpPr>
+      <p:sp>
+        <p:nvSpPr>
+          <p:cNvPr id="2" name="Content Placeholder 1"/>
+          <p:cNvSpPr>
+            <a:spLocks noGrp="1"/>
+          </p:cNvSpPr>
+          <p:nvPr>
+            <p:ph idx="1"/>
+          </p:nvPr>
+        </p:nvSpPr>
+        <p:spPr/>
+        <p:txBody>
+          <a:bodyPr/>
+          <a:lstStyle/>
+          <a:p>
+            <a:endParaRPr lang="en-US" dirty="0" smtClean="0"/>
+          </a:p>
+          <a:p>
+            <a:endParaRPr lang="en-US" dirty="0" smtClean="0"/>
+          </a:p>
+          <a:p>
+            <a:endParaRPr lang="en-US" dirty="0"/>
+          </a:p>
+        </p:txBody>
+      </p:sp>
+      <p:sp>
+        <p:nvSpPr>
+          <p:cNvPr id="3" name="Title 2"/>
+          <p:cNvSpPr>
+            <a:spLocks noGrp="1"/>
+          </p:cNvSpPr>
+          <p:nvPr>
+            <p:ph type="title"/>
+          </p:nvPr>
+        </p:nvSpPr>
+        <p:spPr/>
+        <p:txBody>
+          <a:bodyPr/>
+          <a:lstStyle/>
+          <a:p>
+            <a:r>
+              <a:rPr lang="en-US" dirty="0" smtClean="0"/>
+              <a:t>Mock-ups</a:t>
+            </a:r>
+            <a:endParaRPr lang="en-US" dirty="0"/>
+          </a:p>
+        </p:txBody>
+      </p:sp>
       <p:pic>
         <p:nvPicPr>
-          <p:cNvPr id="4" name="Content Placeholder 3" descr="ERdia.jpg"/>
+          <p:cNvPr id="1026" name="Picture 2" descr="C:\Users\Jonathan\Desktop\ajk73mnhm9vx_278cwv3gzhp_b.png"/>
           <p:cNvPicPr>
-            <a:picLocks noGrp="1" noChangeAspect="1"/>
+            <a:picLocks noChangeAspect="1" noChangeArrowheads="1"/>
           </p:cNvPicPr>
-          <p:nvPr>
-            <p:ph idx="1"/>
-          </p:nvPr>
+          <p:nvPr/>
         </p:nvPicPr>
         <p:blipFill>
-          <a:blip r:embed="rId3" cstate="print"/>
+          <a:blip r:embed="rId2" cstate="print"/>
+          <a:srcRect/>
           <a:stretch>
             <a:fillRect/>
           </a:stretch>
         </p:blipFill>
-        <p:spPr>
+        <p:spPr bwMode="auto">
           <a:xfrm>
-            <a:off x="4200049" y="152400"/>
-            <a:ext cx="4562951" cy="6476048"/>
+            <a:off x="914400" y="1447800"/>
+            <a:ext cx="6011862" cy="2277714"/>
           </a:xfrm>
+          <a:prstGeom prst="rect">
+            <a:avLst/>
+          </a:prstGeom>
+          <a:noFill/>
+          <a:scene3d>
+            <a:camera prst="orthographicFront"/>
+            <a:lightRig rig="threePt" dir="t"/>
+          </a:scene3d>
+          <a:sp3d>
+            <a:bevelT w="165100" prst="coolSlant"/>
+          </a:sp3d>
         </p:spPr>
       </p:pic>
-      <p:sp>
-        <p:nvSpPr>
-          <p:cNvPr id="3" name="Title 2"/>
-          <p:cNvSpPr>
-            <a:spLocks noGrp="1"/>
-          </p:cNvSpPr>
-          <p:nvPr>
-            <p:ph type="title"/>
-          </p:nvPr>
-        </p:nvSpPr>
-        <p:spPr/>
-        <p:txBody>
-          <a:bodyPr/>
-          <a:lstStyle/>
-          <a:p>
-            <a:r>
-              <a:rPr lang="en-US" dirty="0" smtClean="0"/>
-              <a:t>ER Diagram</a:t>
-            </a:r>
-            <a:endParaRPr lang="en-US" dirty="0"/>
-          </a:p>
-        </p:txBody>
-      </p:sp>
+      <p:pic>
+        <p:nvPicPr>
+          <p:cNvPr id="1027" name="Picture 3" descr="C:\Users\Jonathan\Desktop\dfknqc94_51fzqdccfs_b.jpg"/>
+          <p:cNvPicPr>
+            <a:picLocks noChangeAspect="1" noChangeArrowheads="1"/>
+          </p:cNvPicPr>
+          <p:nvPr/>
+        </p:nvPicPr>
+        <p:blipFill>
+          <a:blip r:embed="rId3" cstate="print"/>
+          <a:srcRect/>
+          <a:stretch>
+            <a:fillRect/>
+          </a:stretch>
+        </p:blipFill>
+        <p:spPr bwMode="auto">
+          <a:xfrm>
+            <a:off x="914400" y="4038600"/>
+            <a:ext cx="7486650" cy="2624948"/>
+          </a:xfrm>
+          <a:prstGeom prst="rect">
+            <a:avLst/>
+          </a:prstGeom>
+          <a:noFill/>
+          <a:scene3d>
+            <a:camera prst="orthographicFront"/>
+            <a:lightRig rig="threePt" dir="t"/>
+          </a:scene3d>
+          <a:sp3d>
+            <a:bevelT w="165100" prst="coolSlant"/>
+          </a:sp3d>
+        </p:spPr>
+      </p:pic>
     </p:spTree>
   </p:cSld>
   <p:clrMapOvr>
@@ -6510,12 +7086,12 @@
       </p:grpSpPr>
       <p:sp>
         <p:nvSpPr>
-          <p:cNvPr id="2" name="Content Placeholder 1"/>
-          <p:cNvSpPr>
-            <a:spLocks noGrp="1"/>
-          </p:cNvSpPr>
-          <p:nvPr>
-            <p:ph idx="1"/>
+          <p:cNvPr id="3" name="Title 2"/>
+          <p:cNvSpPr>
+            <a:spLocks noGrp="1"/>
+          </p:cNvSpPr>
+          <p:nvPr>
+            <p:ph type="title"/>
           </p:nvPr>
         </p:nvSpPr>
         <p:spPr/>
@@ -6523,33 +7099,48 @@
           <a:bodyPr/>
           <a:lstStyle/>
           <a:p>
-            <a:endParaRPr lang="en-US"/>
-          </a:p>
-        </p:txBody>
-      </p:sp>
-      <p:sp>
-        <p:nvSpPr>
-          <p:cNvPr id="3" name="Title 2"/>
-          <p:cNvSpPr>
-            <a:spLocks noGrp="1"/>
-          </p:cNvSpPr>
-          <p:nvPr>
-            <p:ph type="title"/>
-          </p:nvPr>
-        </p:nvSpPr>
-        <p:spPr/>
-        <p:txBody>
-          <a:bodyPr/>
-          <a:lstStyle/>
-          <a:p>
             <a:r>
               <a:rPr lang="en-US" dirty="0" smtClean="0"/>
-              <a:t>Interfaces</a:t>
-            </a:r>
-            <a:endParaRPr lang="en-US" dirty="0"/>
-          </a:p>
-        </p:txBody>
-      </p:sp>
+              <a:t>Essential Use Case Example</a:t>
+            </a:r>
+            <a:endParaRPr lang="en-US" dirty="0"/>
+          </a:p>
+        </p:txBody>
+      </p:sp>
+      <p:pic>
+        <p:nvPicPr>
+          <p:cNvPr id="2050" name="Picture 2"/>
+          <p:cNvPicPr>
+            <a:picLocks noGrp="1" noChangeAspect="1" noChangeArrowheads="1"/>
+          </p:cNvPicPr>
+          <p:nvPr>
+            <p:ph idx="1"/>
+          </p:nvPr>
+        </p:nvPicPr>
+        <p:blipFill>
+          <a:blip r:embed="rId2" cstate="print"/>
+          <a:srcRect/>
+          <a:stretch>
+            <a:fillRect/>
+          </a:stretch>
+        </p:blipFill>
+        <p:spPr bwMode="auto">
+          <a:xfrm>
+            <a:off x="457200" y="1752600"/>
+            <a:ext cx="8050752" cy="3629819"/>
+          </a:xfrm>
+          <a:prstGeom prst="rect">
+            <a:avLst/>
+          </a:prstGeom>
+          <a:noFill/>
+          <a:ln w="9525">
+            <a:noFill/>
+            <a:miter lim="800000"/>
+            <a:headEnd/>
+            <a:tailEnd/>
+          </a:ln>
+        </p:spPr>
+      </p:pic>
     </p:spTree>
   </p:cSld>
   <p:clrMapOvr>

</xml_diff>